<commit_message>
Descripción de tus cambios
</commit_message>
<xml_diff>
--- a/assets/docs/Documento_Final.pptx
+++ b/assets/docs/Documento_Final.pptx
@@ -10,7 +10,6 @@
     <p:sldId id="258" r:id="rId4"/>
     <p:sldId id="259" r:id="rId5"/>
     <p:sldId id="260" r:id="rId6"/>
-    <p:sldId id="261" r:id="rId7"/>
   </p:sldIdLst>
   <p:sldSz cx="12192000" cy="6858000"/>
   <p:notesSz cx="6858000" cy="9144000"/>
@@ -109,11 +108,6 @@
       </a:defRPr>
     </a:lvl9pPr>
   </p:defaultTextStyle>
-  <p:extLst>
-    <p:ext uri="{EFAFB233-063F-42B5-8137-9DF3F51BA10A}">
-      <p15:sldGuideLst xmlns:p15="http://schemas.microsoft.com/office/powerpoint/2012/main"/>
-    </p:ext>
-  </p:extLst>
 </p:presentation>
 </file>
 
@@ -139,7 +133,7 @@
           <p:cNvPr id="2" name="Título 1">
             <a:extLst>
               <a:ext uri="{FF2B5EF4-FFF2-40B4-BE49-F238E27FC236}">
-                <a16:creationId xmlns:a16="http://schemas.microsoft.com/office/drawing/2014/main" id="{1ABBF863-E383-43EB-A576-3136B2436F18}"/>
+                <a16:creationId xmlns:a16="http://schemas.microsoft.com/office/drawing/2014/main" id="{6D680C2E-4D51-4847-B547-C83DA100D82A}"/>
               </a:ext>
             </a:extLst>
           </p:cNvPr>
@@ -177,7 +171,7 @@
           <p:cNvPr id="3" name="Subtítulo 2">
             <a:extLst>
               <a:ext uri="{FF2B5EF4-FFF2-40B4-BE49-F238E27FC236}">
-                <a16:creationId xmlns:a16="http://schemas.microsoft.com/office/drawing/2014/main" id="{3186194E-3DF5-4AB1-B10A-C6528DEF125A}"/>
+                <a16:creationId xmlns:a16="http://schemas.microsoft.com/office/drawing/2014/main" id="{C183651B-2EE4-43C9-81B2-881E4BC5C25E}"/>
               </a:ext>
             </a:extLst>
           </p:cNvPr>
@@ -248,7 +242,7 @@
           <p:cNvPr id="4" name="Marcador de fecha 3">
             <a:extLst>
               <a:ext uri="{FF2B5EF4-FFF2-40B4-BE49-F238E27FC236}">
-                <a16:creationId xmlns:a16="http://schemas.microsoft.com/office/drawing/2014/main" id="{0759D430-3411-4F66-847A-A3BB5E761ABF}"/>
+                <a16:creationId xmlns:a16="http://schemas.microsoft.com/office/drawing/2014/main" id="{947E923E-A6D3-4CB1-951E-125FACD7B96F}"/>
               </a:ext>
             </a:extLst>
           </p:cNvPr>
@@ -264,9 +258,9 @@
           <a:bodyPr/>
           <a:lstStyle/>
           <a:p>
-            <a:fld id="{8588056D-2AA2-4399-8400-2BB1E32C2A20}" type="datetimeFigureOut">
+            <a:fld id="{D650E5C9-1D6A-47FA-936B-25F60BF7ECC4}" type="datetimeFigureOut">
               <a:rPr lang="en-US" smtClean="0"/>
-              <a:t>8/12/2025</a:t>
+              <a:t>10/15/2025</a:t>
             </a:fld>
             <a:endParaRPr lang="en-US"/>
           </a:p>
@@ -277,7 +271,7 @@
           <p:cNvPr id="5" name="Marcador de pie de página 4">
             <a:extLst>
               <a:ext uri="{FF2B5EF4-FFF2-40B4-BE49-F238E27FC236}">
-                <a16:creationId xmlns:a16="http://schemas.microsoft.com/office/drawing/2014/main" id="{1A5BAC35-DF45-4812-B756-6EEFDFD36C5E}"/>
+                <a16:creationId xmlns:a16="http://schemas.microsoft.com/office/drawing/2014/main" id="{34D4B5D8-32EC-46F1-8F41-C83DD34FD649}"/>
               </a:ext>
             </a:extLst>
           </p:cNvPr>
@@ -302,7 +296,7 @@
           <p:cNvPr id="6" name="Marcador de número de diapositiva 5">
             <a:extLst>
               <a:ext uri="{FF2B5EF4-FFF2-40B4-BE49-F238E27FC236}">
-                <a16:creationId xmlns:a16="http://schemas.microsoft.com/office/drawing/2014/main" id="{E97F7527-9520-4BCC-8F0A-2525FF95A1BD}"/>
+                <a16:creationId xmlns:a16="http://schemas.microsoft.com/office/drawing/2014/main" id="{5ED53F10-D5B4-4BCB-8227-826B0DCF3E6A}"/>
               </a:ext>
             </a:extLst>
           </p:cNvPr>
@@ -318,7 +312,7 @@
           <a:bodyPr/>
           <a:lstStyle/>
           <a:p>
-            <a:fld id="{9C7B1245-2384-4BDE-9B43-9AD3B9B72D39}" type="slidenum">
+            <a:fld id="{03206E23-133B-40BF-9B80-283263BFD353}" type="slidenum">
               <a:rPr lang="en-US" smtClean="0"/>
               <a:t>‹Nº›</a:t>
             </a:fld>
@@ -329,7 +323,7 @@
     </p:spTree>
     <p:extLst>
       <p:ext uri="{BB962C8B-B14F-4D97-AF65-F5344CB8AC3E}">
-        <p14:creationId xmlns:p14="http://schemas.microsoft.com/office/powerpoint/2010/main" val="3155270636"/>
+        <p14:creationId xmlns:p14="http://schemas.microsoft.com/office/powerpoint/2010/main" val="1694459763"/>
       </p:ext>
     </p:extLst>
   </p:cSld>
@@ -361,7 +355,7 @@
           <p:cNvPr id="2" name="Título 1">
             <a:extLst>
               <a:ext uri="{FF2B5EF4-FFF2-40B4-BE49-F238E27FC236}">
-                <a16:creationId xmlns:a16="http://schemas.microsoft.com/office/drawing/2014/main" id="{8B46E50D-5E8F-48FE-B73F-AF02CF0D4537}"/>
+                <a16:creationId xmlns:a16="http://schemas.microsoft.com/office/drawing/2014/main" id="{98B64C72-4B4C-4FAA-9BF9-A582C5FACD4B}"/>
               </a:ext>
             </a:extLst>
           </p:cNvPr>
@@ -390,7 +384,7 @@
           <p:cNvPr id="3" name="Marcador de texto vertical 2">
             <a:extLst>
               <a:ext uri="{FF2B5EF4-FFF2-40B4-BE49-F238E27FC236}">
-                <a16:creationId xmlns:a16="http://schemas.microsoft.com/office/drawing/2014/main" id="{F7730CBD-87EE-4286-8E7B-83AA75C3A09A}"/>
+                <a16:creationId xmlns:a16="http://schemas.microsoft.com/office/drawing/2014/main" id="{280A42BE-C9F4-452A-AA8C-DEAF7A66C9BB}"/>
               </a:ext>
             </a:extLst>
           </p:cNvPr>
@@ -448,7 +442,7 @@
           <p:cNvPr id="4" name="Marcador de fecha 3">
             <a:extLst>
               <a:ext uri="{FF2B5EF4-FFF2-40B4-BE49-F238E27FC236}">
-                <a16:creationId xmlns:a16="http://schemas.microsoft.com/office/drawing/2014/main" id="{875760C8-9B7A-4EDC-88C3-234DB0B972CC}"/>
+                <a16:creationId xmlns:a16="http://schemas.microsoft.com/office/drawing/2014/main" id="{C5E66665-E4EB-45C7-91E3-D8DEA656DF5B}"/>
               </a:ext>
             </a:extLst>
           </p:cNvPr>
@@ -464,9 +458,9 @@
           <a:bodyPr/>
           <a:lstStyle/>
           <a:p>
-            <a:fld id="{8588056D-2AA2-4399-8400-2BB1E32C2A20}" type="datetimeFigureOut">
+            <a:fld id="{D650E5C9-1D6A-47FA-936B-25F60BF7ECC4}" type="datetimeFigureOut">
               <a:rPr lang="en-US" smtClean="0"/>
-              <a:t>8/12/2025</a:t>
+              <a:t>10/15/2025</a:t>
             </a:fld>
             <a:endParaRPr lang="en-US"/>
           </a:p>
@@ -477,7 +471,7 @@
           <p:cNvPr id="5" name="Marcador de pie de página 4">
             <a:extLst>
               <a:ext uri="{FF2B5EF4-FFF2-40B4-BE49-F238E27FC236}">
-                <a16:creationId xmlns:a16="http://schemas.microsoft.com/office/drawing/2014/main" id="{FC9DA1F1-7838-48C6-8206-3411689C7CE9}"/>
+                <a16:creationId xmlns:a16="http://schemas.microsoft.com/office/drawing/2014/main" id="{CB760C84-E3A2-4D97-9F0B-56E66C04101D}"/>
               </a:ext>
             </a:extLst>
           </p:cNvPr>
@@ -502,7 +496,7 @@
           <p:cNvPr id="6" name="Marcador de número de diapositiva 5">
             <a:extLst>
               <a:ext uri="{FF2B5EF4-FFF2-40B4-BE49-F238E27FC236}">
-                <a16:creationId xmlns:a16="http://schemas.microsoft.com/office/drawing/2014/main" id="{1DEA7BC9-833A-4E13-8E92-55B7DD7A7A04}"/>
+                <a16:creationId xmlns:a16="http://schemas.microsoft.com/office/drawing/2014/main" id="{4B67B577-637B-4E3F-9905-BDC0F23CAE01}"/>
               </a:ext>
             </a:extLst>
           </p:cNvPr>
@@ -518,7 +512,7 @@
           <a:bodyPr/>
           <a:lstStyle/>
           <a:p>
-            <a:fld id="{9C7B1245-2384-4BDE-9B43-9AD3B9B72D39}" type="slidenum">
+            <a:fld id="{03206E23-133B-40BF-9B80-283263BFD353}" type="slidenum">
               <a:rPr lang="en-US" smtClean="0"/>
               <a:t>‹Nº›</a:t>
             </a:fld>
@@ -529,7 +523,7 @@
     </p:spTree>
     <p:extLst>
       <p:ext uri="{BB962C8B-B14F-4D97-AF65-F5344CB8AC3E}">
-        <p14:creationId xmlns:p14="http://schemas.microsoft.com/office/powerpoint/2010/main" val="2173375988"/>
+        <p14:creationId xmlns:p14="http://schemas.microsoft.com/office/powerpoint/2010/main" val="328461882"/>
       </p:ext>
     </p:extLst>
   </p:cSld>
@@ -561,7 +555,7 @@
           <p:cNvPr id="2" name="Título vertical 1">
             <a:extLst>
               <a:ext uri="{FF2B5EF4-FFF2-40B4-BE49-F238E27FC236}">
-                <a16:creationId xmlns:a16="http://schemas.microsoft.com/office/drawing/2014/main" id="{F9D892A5-940D-401A-A707-55508B9F7115}"/>
+                <a16:creationId xmlns:a16="http://schemas.microsoft.com/office/drawing/2014/main" id="{1CD14CA2-DEF8-48AC-96F1-A2B0E7D2CB4D}"/>
               </a:ext>
             </a:extLst>
           </p:cNvPr>
@@ -595,7 +589,7 @@
           <p:cNvPr id="3" name="Marcador de texto vertical 2">
             <a:extLst>
               <a:ext uri="{FF2B5EF4-FFF2-40B4-BE49-F238E27FC236}">
-                <a16:creationId xmlns:a16="http://schemas.microsoft.com/office/drawing/2014/main" id="{F9E44941-274C-41E3-A2CC-02D28AC9DB40}"/>
+                <a16:creationId xmlns:a16="http://schemas.microsoft.com/office/drawing/2014/main" id="{4145108C-E9CD-4DF4-B3A6-92119EFF1777}"/>
               </a:ext>
             </a:extLst>
           </p:cNvPr>
@@ -658,7 +652,7 @@
           <p:cNvPr id="4" name="Marcador de fecha 3">
             <a:extLst>
               <a:ext uri="{FF2B5EF4-FFF2-40B4-BE49-F238E27FC236}">
-                <a16:creationId xmlns:a16="http://schemas.microsoft.com/office/drawing/2014/main" id="{8CEF2F98-01E6-462C-9265-5EE9DB43ECFE}"/>
+                <a16:creationId xmlns:a16="http://schemas.microsoft.com/office/drawing/2014/main" id="{A81B43D9-1942-427E-8883-FA22FD875719}"/>
               </a:ext>
             </a:extLst>
           </p:cNvPr>
@@ -674,9 +668,9 @@
           <a:bodyPr/>
           <a:lstStyle/>
           <a:p>
-            <a:fld id="{8588056D-2AA2-4399-8400-2BB1E32C2A20}" type="datetimeFigureOut">
+            <a:fld id="{D650E5C9-1D6A-47FA-936B-25F60BF7ECC4}" type="datetimeFigureOut">
               <a:rPr lang="en-US" smtClean="0"/>
-              <a:t>8/12/2025</a:t>
+              <a:t>10/15/2025</a:t>
             </a:fld>
             <a:endParaRPr lang="en-US"/>
           </a:p>
@@ -687,7 +681,7 @@
           <p:cNvPr id="5" name="Marcador de pie de página 4">
             <a:extLst>
               <a:ext uri="{FF2B5EF4-FFF2-40B4-BE49-F238E27FC236}">
-                <a16:creationId xmlns:a16="http://schemas.microsoft.com/office/drawing/2014/main" id="{B4637135-99B7-4191-8658-5961345F820F}"/>
+                <a16:creationId xmlns:a16="http://schemas.microsoft.com/office/drawing/2014/main" id="{AEC7E0B3-1E85-416E-890E-0B8E1D6CD452}"/>
               </a:ext>
             </a:extLst>
           </p:cNvPr>
@@ -712,7 +706,7 @@
           <p:cNvPr id="6" name="Marcador de número de diapositiva 5">
             <a:extLst>
               <a:ext uri="{FF2B5EF4-FFF2-40B4-BE49-F238E27FC236}">
-                <a16:creationId xmlns:a16="http://schemas.microsoft.com/office/drawing/2014/main" id="{37CC2171-7469-4F18-81FA-AAF6E2BC7480}"/>
+                <a16:creationId xmlns:a16="http://schemas.microsoft.com/office/drawing/2014/main" id="{1C2078B1-5510-45B9-9314-466BC86D6588}"/>
               </a:ext>
             </a:extLst>
           </p:cNvPr>
@@ -728,7 +722,7 @@
           <a:bodyPr/>
           <a:lstStyle/>
           <a:p>
-            <a:fld id="{9C7B1245-2384-4BDE-9B43-9AD3B9B72D39}" type="slidenum">
+            <a:fld id="{03206E23-133B-40BF-9B80-283263BFD353}" type="slidenum">
               <a:rPr lang="en-US" smtClean="0"/>
               <a:t>‹Nº›</a:t>
             </a:fld>
@@ -739,7 +733,7 @@
     </p:spTree>
     <p:extLst>
       <p:ext uri="{BB962C8B-B14F-4D97-AF65-F5344CB8AC3E}">
-        <p14:creationId xmlns:p14="http://schemas.microsoft.com/office/powerpoint/2010/main" val="3064923443"/>
+        <p14:creationId xmlns:p14="http://schemas.microsoft.com/office/powerpoint/2010/main" val="1186754599"/>
       </p:ext>
     </p:extLst>
   </p:cSld>
@@ -771,7 +765,7 @@
           <p:cNvPr id="2" name="Título 1">
             <a:extLst>
               <a:ext uri="{FF2B5EF4-FFF2-40B4-BE49-F238E27FC236}">
-                <a16:creationId xmlns:a16="http://schemas.microsoft.com/office/drawing/2014/main" id="{818A898D-DBB1-45D0-A865-61F1E13F8C1A}"/>
+                <a16:creationId xmlns:a16="http://schemas.microsoft.com/office/drawing/2014/main" id="{7405D232-66CB-4608-9378-62A4C3A08950}"/>
               </a:ext>
             </a:extLst>
           </p:cNvPr>
@@ -800,7 +794,7 @@
           <p:cNvPr id="3" name="Marcador de contenido 2">
             <a:extLst>
               <a:ext uri="{FF2B5EF4-FFF2-40B4-BE49-F238E27FC236}">
-                <a16:creationId xmlns:a16="http://schemas.microsoft.com/office/drawing/2014/main" id="{3E276DE2-0DBD-479D-AE0F-43D5C977D8E4}"/>
+                <a16:creationId xmlns:a16="http://schemas.microsoft.com/office/drawing/2014/main" id="{DA897B26-CAC4-48B1-AAE3-8447BCCFA0C2}"/>
               </a:ext>
             </a:extLst>
           </p:cNvPr>
@@ -858,7 +852,7 @@
           <p:cNvPr id="4" name="Marcador de fecha 3">
             <a:extLst>
               <a:ext uri="{FF2B5EF4-FFF2-40B4-BE49-F238E27FC236}">
-                <a16:creationId xmlns:a16="http://schemas.microsoft.com/office/drawing/2014/main" id="{4CC52A1D-B4E2-4365-9BD3-447F79624A67}"/>
+                <a16:creationId xmlns:a16="http://schemas.microsoft.com/office/drawing/2014/main" id="{B736055A-BB46-4F9A-996A-B8A060FAB5F1}"/>
               </a:ext>
             </a:extLst>
           </p:cNvPr>
@@ -874,9 +868,9 @@
           <a:bodyPr/>
           <a:lstStyle/>
           <a:p>
-            <a:fld id="{8588056D-2AA2-4399-8400-2BB1E32C2A20}" type="datetimeFigureOut">
+            <a:fld id="{D650E5C9-1D6A-47FA-936B-25F60BF7ECC4}" type="datetimeFigureOut">
               <a:rPr lang="en-US" smtClean="0"/>
-              <a:t>8/12/2025</a:t>
+              <a:t>10/15/2025</a:t>
             </a:fld>
             <a:endParaRPr lang="en-US"/>
           </a:p>
@@ -887,7 +881,7 @@
           <p:cNvPr id="5" name="Marcador de pie de página 4">
             <a:extLst>
               <a:ext uri="{FF2B5EF4-FFF2-40B4-BE49-F238E27FC236}">
-                <a16:creationId xmlns:a16="http://schemas.microsoft.com/office/drawing/2014/main" id="{CBAC9D0B-49B8-489D-9D33-F220D2D5D004}"/>
+                <a16:creationId xmlns:a16="http://schemas.microsoft.com/office/drawing/2014/main" id="{6F0C7212-7547-4AB9-AA7E-DF473EBB2B6F}"/>
               </a:ext>
             </a:extLst>
           </p:cNvPr>
@@ -912,7 +906,7 @@
           <p:cNvPr id="6" name="Marcador de número de diapositiva 5">
             <a:extLst>
               <a:ext uri="{FF2B5EF4-FFF2-40B4-BE49-F238E27FC236}">
-                <a16:creationId xmlns:a16="http://schemas.microsoft.com/office/drawing/2014/main" id="{EB2C5C92-E30A-4A7F-85E1-F7055B01A9A7}"/>
+                <a16:creationId xmlns:a16="http://schemas.microsoft.com/office/drawing/2014/main" id="{CA697AAE-4D98-4B6D-BE24-BA17E78AE140}"/>
               </a:ext>
             </a:extLst>
           </p:cNvPr>
@@ -928,7 +922,7 @@
           <a:bodyPr/>
           <a:lstStyle/>
           <a:p>
-            <a:fld id="{9C7B1245-2384-4BDE-9B43-9AD3B9B72D39}" type="slidenum">
+            <a:fld id="{03206E23-133B-40BF-9B80-283263BFD353}" type="slidenum">
               <a:rPr lang="en-US" smtClean="0"/>
               <a:t>‹Nº›</a:t>
             </a:fld>
@@ -939,7 +933,7 @@
     </p:spTree>
     <p:extLst>
       <p:ext uri="{BB962C8B-B14F-4D97-AF65-F5344CB8AC3E}">
-        <p14:creationId xmlns:p14="http://schemas.microsoft.com/office/powerpoint/2010/main" val="74060509"/>
+        <p14:creationId xmlns:p14="http://schemas.microsoft.com/office/powerpoint/2010/main" val="969406014"/>
       </p:ext>
     </p:extLst>
   </p:cSld>
@@ -971,7 +965,7 @@
           <p:cNvPr id="2" name="Título 1">
             <a:extLst>
               <a:ext uri="{FF2B5EF4-FFF2-40B4-BE49-F238E27FC236}">
-                <a16:creationId xmlns:a16="http://schemas.microsoft.com/office/drawing/2014/main" id="{0DA09B39-AB28-4942-AC85-437E993BF3E0}"/>
+                <a16:creationId xmlns:a16="http://schemas.microsoft.com/office/drawing/2014/main" id="{2DD1B2DC-AB15-468E-8D55-C42D98795BCA}"/>
               </a:ext>
             </a:extLst>
           </p:cNvPr>
@@ -1009,7 +1003,7 @@
           <p:cNvPr id="3" name="Marcador de texto 2">
             <a:extLst>
               <a:ext uri="{FF2B5EF4-FFF2-40B4-BE49-F238E27FC236}">
-                <a16:creationId xmlns:a16="http://schemas.microsoft.com/office/drawing/2014/main" id="{3C3F5803-A137-4446-B461-C0334368C45B}"/>
+                <a16:creationId xmlns:a16="http://schemas.microsoft.com/office/drawing/2014/main" id="{7C03D454-2D51-4B4A-898E-A2E1383E6643}"/>
               </a:ext>
             </a:extLst>
           </p:cNvPr>
@@ -1134,7 +1128,7 @@
           <p:cNvPr id="4" name="Marcador de fecha 3">
             <a:extLst>
               <a:ext uri="{FF2B5EF4-FFF2-40B4-BE49-F238E27FC236}">
-                <a16:creationId xmlns:a16="http://schemas.microsoft.com/office/drawing/2014/main" id="{00D17CE7-5669-4255-9927-7680F99514D1}"/>
+                <a16:creationId xmlns:a16="http://schemas.microsoft.com/office/drawing/2014/main" id="{6C9D864A-CFFC-4979-93BB-CF3521764BDF}"/>
               </a:ext>
             </a:extLst>
           </p:cNvPr>
@@ -1150,9 +1144,9 @@
           <a:bodyPr/>
           <a:lstStyle/>
           <a:p>
-            <a:fld id="{8588056D-2AA2-4399-8400-2BB1E32C2A20}" type="datetimeFigureOut">
+            <a:fld id="{D650E5C9-1D6A-47FA-936B-25F60BF7ECC4}" type="datetimeFigureOut">
               <a:rPr lang="en-US" smtClean="0"/>
-              <a:t>8/12/2025</a:t>
+              <a:t>10/15/2025</a:t>
             </a:fld>
             <a:endParaRPr lang="en-US"/>
           </a:p>
@@ -1163,7 +1157,7 @@
           <p:cNvPr id="5" name="Marcador de pie de página 4">
             <a:extLst>
               <a:ext uri="{FF2B5EF4-FFF2-40B4-BE49-F238E27FC236}">
-                <a16:creationId xmlns:a16="http://schemas.microsoft.com/office/drawing/2014/main" id="{706D23C9-D632-4CE7-91D7-C8AA24BF6A99}"/>
+                <a16:creationId xmlns:a16="http://schemas.microsoft.com/office/drawing/2014/main" id="{EFACF488-DF60-4DB4-8DE3-7CCB2F7A4866}"/>
               </a:ext>
             </a:extLst>
           </p:cNvPr>
@@ -1188,7 +1182,7 @@
           <p:cNvPr id="6" name="Marcador de número de diapositiva 5">
             <a:extLst>
               <a:ext uri="{FF2B5EF4-FFF2-40B4-BE49-F238E27FC236}">
-                <a16:creationId xmlns:a16="http://schemas.microsoft.com/office/drawing/2014/main" id="{B992F441-950A-46E2-86A6-EACE60C10C05}"/>
+                <a16:creationId xmlns:a16="http://schemas.microsoft.com/office/drawing/2014/main" id="{B4988D5D-6117-49A3-ABC9-2B2794356614}"/>
               </a:ext>
             </a:extLst>
           </p:cNvPr>
@@ -1204,7 +1198,7 @@
           <a:bodyPr/>
           <a:lstStyle/>
           <a:p>
-            <a:fld id="{9C7B1245-2384-4BDE-9B43-9AD3B9B72D39}" type="slidenum">
+            <a:fld id="{03206E23-133B-40BF-9B80-283263BFD353}" type="slidenum">
               <a:rPr lang="en-US" smtClean="0"/>
               <a:t>‹Nº›</a:t>
             </a:fld>
@@ -1215,7 +1209,7 @@
     </p:spTree>
     <p:extLst>
       <p:ext uri="{BB962C8B-B14F-4D97-AF65-F5344CB8AC3E}">
-        <p14:creationId xmlns:p14="http://schemas.microsoft.com/office/powerpoint/2010/main" val="2845479069"/>
+        <p14:creationId xmlns:p14="http://schemas.microsoft.com/office/powerpoint/2010/main" val="2282111977"/>
       </p:ext>
     </p:extLst>
   </p:cSld>
@@ -1247,7 +1241,7 @@
           <p:cNvPr id="2" name="Título 1">
             <a:extLst>
               <a:ext uri="{FF2B5EF4-FFF2-40B4-BE49-F238E27FC236}">
-                <a16:creationId xmlns:a16="http://schemas.microsoft.com/office/drawing/2014/main" id="{B2831E65-A8AA-4437-BF9E-49E5E33A7D94}"/>
+                <a16:creationId xmlns:a16="http://schemas.microsoft.com/office/drawing/2014/main" id="{EBD42F1A-A93F-40B8-902F-E58DE3E9C476}"/>
               </a:ext>
             </a:extLst>
           </p:cNvPr>
@@ -1276,7 +1270,7 @@
           <p:cNvPr id="3" name="Marcador de contenido 2">
             <a:extLst>
               <a:ext uri="{FF2B5EF4-FFF2-40B4-BE49-F238E27FC236}">
-                <a16:creationId xmlns:a16="http://schemas.microsoft.com/office/drawing/2014/main" id="{C74C5868-E84F-48E9-A0FD-3C725D8A1D4E}"/>
+                <a16:creationId xmlns:a16="http://schemas.microsoft.com/office/drawing/2014/main" id="{5759B2EE-B347-43B6-99A9-C2BF9DDF51EC}"/>
               </a:ext>
             </a:extLst>
           </p:cNvPr>
@@ -1339,7 +1333,7 @@
           <p:cNvPr id="4" name="Marcador de contenido 3">
             <a:extLst>
               <a:ext uri="{FF2B5EF4-FFF2-40B4-BE49-F238E27FC236}">
-                <a16:creationId xmlns:a16="http://schemas.microsoft.com/office/drawing/2014/main" id="{C96A5E6F-86B3-4D80-A4AB-EF7235DD9106}"/>
+                <a16:creationId xmlns:a16="http://schemas.microsoft.com/office/drawing/2014/main" id="{7E6AC42F-9E64-48B2-9D2C-C27FA4079A6F}"/>
               </a:ext>
             </a:extLst>
           </p:cNvPr>
@@ -1402,7 +1396,7 @@
           <p:cNvPr id="5" name="Marcador de fecha 4">
             <a:extLst>
               <a:ext uri="{FF2B5EF4-FFF2-40B4-BE49-F238E27FC236}">
-                <a16:creationId xmlns:a16="http://schemas.microsoft.com/office/drawing/2014/main" id="{CA95B1AA-772C-4712-A6C2-AA17875CD098}"/>
+                <a16:creationId xmlns:a16="http://schemas.microsoft.com/office/drawing/2014/main" id="{A58C5D31-1A51-4E11-8FE8-DF67FB419FB3}"/>
               </a:ext>
             </a:extLst>
           </p:cNvPr>
@@ -1418,9 +1412,9 @@
           <a:bodyPr/>
           <a:lstStyle/>
           <a:p>
-            <a:fld id="{8588056D-2AA2-4399-8400-2BB1E32C2A20}" type="datetimeFigureOut">
+            <a:fld id="{D650E5C9-1D6A-47FA-936B-25F60BF7ECC4}" type="datetimeFigureOut">
               <a:rPr lang="en-US" smtClean="0"/>
-              <a:t>8/12/2025</a:t>
+              <a:t>10/15/2025</a:t>
             </a:fld>
             <a:endParaRPr lang="en-US"/>
           </a:p>
@@ -1431,7 +1425,7 @@
           <p:cNvPr id="6" name="Marcador de pie de página 5">
             <a:extLst>
               <a:ext uri="{FF2B5EF4-FFF2-40B4-BE49-F238E27FC236}">
-                <a16:creationId xmlns:a16="http://schemas.microsoft.com/office/drawing/2014/main" id="{61311860-9507-476B-9098-FE600FEC70FD}"/>
+                <a16:creationId xmlns:a16="http://schemas.microsoft.com/office/drawing/2014/main" id="{A9C7F269-38D5-47B9-86FF-0DF51EAB9FE9}"/>
               </a:ext>
             </a:extLst>
           </p:cNvPr>
@@ -1456,7 +1450,7 @@
           <p:cNvPr id="7" name="Marcador de número de diapositiva 6">
             <a:extLst>
               <a:ext uri="{FF2B5EF4-FFF2-40B4-BE49-F238E27FC236}">
-                <a16:creationId xmlns:a16="http://schemas.microsoft.com/office/drawing/2014/main" id="{23B2EDBD-01CC-4CB9-9180-8BDFB744F238}"/>
+                <a16:creationId xmlns:a16="http://schemas.microsoft.com/office/drawing/2014/main" id="{AB048666-4CCD-4C24-9852-6709F9483CBF}"/>
               </a:ext>
             </a:extLst>
           </p:cNvPr>
@@ -1472,7 +1466,7 @@
           <a:bodyPr/>
           <a:lstStyle/>
           <a:p>
-            <a:fld id="{9C7B1245-2384-4BDE-9B43-9AD3B9B72D39}" type="slidenum">
+            <a:fld id="{03206E23-133B-40BF-9B80-283263BFD353}" type="slidenum">
               <a:rPr lang="en-US" smtClean="0"/>
               <a:t>‹Nº›</a:t>
             </a:fld>
@@ -1483,7 +1477,7 @@
     </p:spTree>
     <p:extLst>
       <p:ext uri="{BB962C8B-B14F-4D97-AF65-F5344CB8AC3E}">
-        <p14:creationId xmlns:p14="http://schemas.microsoft.com/office/powerpoint/2010/main" val="1967895869"/>
+        <p14:creationId xmlns:p14="http://schemas.microsoft.com/office/powerpoint/2010/main" val="3206737186"/>
       </p:ext>
     </p:extLst>
   </p:cSld>
@@ -1515,7 +1509,7 @@
           <p:cNvPr id="2" name="Título 1">
             <a:extLst>
               <a:ext uri="{FF2B5EF4-FFF2-40B4-BE49-F238E27FC236}">
-                <a16:creationId xmlns:a16="http://schemas.microsoft.com/office/drawing/2014/main" id="{23E81899-9A91-4E13-9B0B-4EBAE4F377ED}"/>
+                <a16:creationId xmlns:a16="http://schemas.microsoft.com/office/drawing/2014/main" id="{806D199D-EB1A-46AE-A4E8-716CC63356AA}"/>
               </a:ext>
             </a:extLst>
           </p:cNvPr>
@@ -1549,7 +1543,7 @@
           <p:cNvPr id="3" name="Marcador de texto 2">
             <a:extLst>
               <a:ext uri="{FF2B5EF4-FFF2-40B4-BE49-F238E27FC236}">
-                <a16:creationId xmlns:a16="http://schemas.microsoft.com/office/drawing/2014/main" id="{E4AE635F-202E-45E5-833D-EB58CA56ACA8}"/>
+                <a16:creationId xmlns:a16="http://schemas.microsoft.com/office/drawing/2014/main" id="{FC31F824-3574-461B-986E-F3CD12849498}"/>
               </a:ext>
             </a:extLst>
           </p:cNvPr>
@@ -1620,7 +1614,7 @@
           <p:cNvPr id="4" name="Marcador de contenido 3">
             <a:extLst>
               <a:ext uri="{FF2B5EF4-FFF2-40B4-BE49-F238E27FC236}">
-                <a16:creationId xmlns:a16="http://schemas.microsoft.com/office/drawing/2014/main" id="{FCADE640-9D4D-45A9-B32B-B4C953C7686F}"/>
+                <a16:creationId xmlns:a16="http://schemas.microsoft.com/office/drawing/2014/main" id="{36DE64FA-9D83-488C-BBBD-081C3481E4BF}"/>
               </a:ext>
             </a:extLst>
           </p:cNvPr>
@@ -1683,7 +1677,7 @@
           <p:cNvPr id="5" name="Marcador de texto 4">
             <a:extLst>
               <a:ext uri="{FF2B5EF4-FFF2-40B4-BE49-F238E27FC236}">
-                <a16:creationId xmlns:a16="http://schemas.microsoft.com/office/drawing/2014/main" id="{8B01B521-4ECF-49E7-97CF-3EBE643E6783}"/>
+                <a16:creationId xmlns:a16="http://schemas.microsoft.com/office/drawing/2014/main" id="{BDDD7BBF-1491-4373-B833-826AFA046357}"/>
               </a:ext>
             </a:extLst>
           </p:cNvPr>
@@ -1754,7 +1748,7 @@
           <p:cNvPr id="6" name="Marcador de contenido 5">
             <a:extLst>
               <a:ext uri="{FF2B5EF4-FFF2-40B4-BE49-F238E27FC236}">
-                <a16:creationId xmlns:a16="http://schemas.microsoft.com/office/drawing/2014/main" id="{3082F677-DFFD-4B62-8DC1-C083A9F64377}"/>
+                <a16:creationId xmlns:a16="http://schemas.microsoft.com/office/drawing/2014/main" id="{59C789E8-2D10-4EA4-A2B8-984D376F9D5C}"/>
               </a:ext>
             </a:extLst>
           </p:cNvPr>
@@ -1817,7 +1811,7 @@
           <p:cNvPr id="7" name="Marcador de fecha 6">
             <a:extLst>
               <a:ext uri="{FF2B5EF4-FFF2-40B4-BE49-F238E27FC236}">
-                <a16:creationId xmlns:a16="http://schemas.microsoft.com/office/drawing/2014/main" id="{F224F280-E7BD-41EB-9576-04C3736B9F9C}"/>
+                <a16:creationId xmlns:a16="http://schemas.microsoft.com/office/drawing/2014/main" id="{2732E0CD-1642-497D-AB49-3DC03AD55629}"/>
               </a:ext>
             </a:extLst>
           </p:cNvPr>
@@ -1833,9 +1827,9 @@
           <a:bodyPr/>
           <a:lstStyle/>
           <a:p>
-            <a:fld id="{8588056D-2AA2-4399-8400-2BB1E32C2A20}" type="datetimeFigureOut">
+            <a:fld id="{D650E5C9-1D6A-47FA-936B-25F60BF7ECC4}" type="datetimeFigureOut">
               <a:rPr lang="en-US" smtClean="0"/>
-              <a:t>8/12/2025</a:t>
+              <a:t>10/15/2025</a:t>
             </a:fld>
             <a:endParaRPr lang="en-US"/>
           </a:p>
@@ -1846,7 +1840,7 @@
           <p:cNvPr id="8" name="Marcador de pie de página 7">
             <a:extLst>
               <a:ext uri="{FF2B5EF4-FFF2-40B4-BE49-F238E27FC236}">
-                <a16:creationId xmlns:a16="http://schemas.microsoft.com/office/drawing/2014/main" id="{F8541FA3-3C47-47F3-8621-4F7EA183B88D}"/>
+                <a16:creationId xmlns:a16="http://schemas.microsoft.com/office/drawing/2014/main" id="{509AE20E-A6D1-4273-8696-ABE11ECD5C27}"/>
               </a:ext>
             </a:extLst>
           </p:cNvPr>
@@ -1871,7 +1865,7 @@
           <p:cNvPr id="9" name="Marcador de número de diapositiva 8">
             <a:extLst>
               <a:ext uri="{FF2B5EF4-FFF2-40B4-BE49-F238E27FC236}">
-                <a16:creationId xmlns:a16="http://schemas.microsoft.com/office/drawing/2014/main" id="{42631E94-ECA8-4DF2-8C3B-711F59A95B0F}"/>
+                <a16:creationId xmlns:a16="http://schemas.microsoft.com/office/drawing/2014/main" id="{EB65257C-3216-4641-8F14-C453FD5DD759}"/>
               </a:ext>
             </a:extLst>
           </p:cNvPr>
@@ -1887,7 +1881,7 @@
           <a:bodyPr/>
           <a:lstStyle/>
           <a:p>
-            <a:fld id="{9C7B1245-2384-4BDE-9B43-9AD3B9B72D39}" type="slidenum">
+            <a:fld id="{03206E23-133B-40BF-9B80-283263BFD353}" type="slidenum">
               <a:rPr lang="en-US" smtClean="0"/>
               <a:t>‹Nº›</a:t>
             </a:fld>
@@ -1898,7 +1892,7 @@
     </p:spTree>
     <p:extLst>
       <p:ext uri="{BB962C8B-B14F-4D97-AF65-F5344CB8AC3E}">
-        <p14:creationId xmlns:p14="http://schemas.microsoft.com/office/powerpoint/2010/main" val="1365546487"/>
+        <p14:creationId xmlns:p14="http://schemas.microsoft.com/office/powerpoint/2010/main" val="3403732200"/>
       </p:ext>
     </p:extLst>
   </p:cSld>
@@ -1930,7 +1924,7 @@
           <p:cNvPr id="2" name="Título 1">
             <a:extLst>
               <a:ext uri="{FF2B5EF4-FFF2-40B4-BE49-F238E27FC236}">
-                <a16:creationId xmlns:a16="http://schemas.microsoft.com/office/drawing/2014/main" id="{53E5FED0-052B-4A18-8AF4-AABBD1F4DC73}"/>
+                <a16:creationId xmlns:a16="http://schemas.microsoft.com/office/drawing/2014/main" id="{FEE46CCB-E4F3-455E-B83E-39A9DA36D46E}"/>
               </a:ext>
             </a:extLst>
           </p:cNvPr>
@@ -1959,7 +1953,7 @@
           <p:cNvPr id="3" name="Marcador de fecha 2">
             <a:extLst>
               <a:ext uri="{FF2B5EF4-FFF2-40B4-BE49-F238E27FC236}">
-                <a16:creationId xmlns:a16="http://schemas.microsoft.com/office/drawing/2014/main" id="{472CCE7C-FBC9-4F21-8356-DE09E9E06139}"/>
+                <a16:creationId xmlns:a16="http://schemas.microsoft.com/office/drawing/2014/main" id="{6E2EE01D-28BE-40BF-B1E6-CDEDEAEA1427}"/>
               </a:ext>
             </a:extLst>
           </p:cNvPr>
@@ -1975,9 +1969,9 @@
           <a:bodyPr/>
           <a:lstStyle/>
           <a:p>
-            <a:fld id="{8588056D-2AA2-4399-8400-2BB1E32C2A20}" type="datetimeFigureOut">
+            <a:fld id="{D650E5C9-1D6A-47FA-936B-25F60BF7ECC4}" type="datetimeFigureOut">
               <a:rPr lang="en-US" smtClean="0"/>
-              <a:t>8/12/2025</a:t>
+              <a:t>10/15/2025</a:t>
             </a:fld>
             <a:endParaRPr lang="en-US"/>
           </a:p>
@@ -1988,7 +1982,7 @@
           <p:cNvPr id="4" name="Marcador de pie de página 3">
             <a:extLst>
               <a:ext uri="{FF2B5EF4-FFF2-40B4-BE49-F238E27FC236}">
-                <a16:creationId xmlns:a16="http://schemas.microsoft.com/office/drawing/2014/main" id="{F7B261B4-5658-4111-A290-E834825D582C}"/>
+                <a16:creationId xmlns:a16="http://schemas.microsoft.com/office/drawing/2014/main" id="{648E5747-5317-4193-BB35-E21F8C4197CD}"/>
               </a:ext>
             </a:extLst>
           </p:cNvPr>
@@ -2013,7 +2007,7 @@
           <p:cNvPr id="5" name="Marcador de número de diapositiva 4">
             <a:extLst>
               <a:ext uri="{FF2B5EF4-FFF2-40B4-BE49-F238E27FC236}">
-                <a16:creationId xmlns:a16="http://schemas.microsoft.com/office/drawing/2014/main" id="{FF43598D-149C-4972-AE14-F8BC8467A582}"/>
+                <a16:creationId xmlns:a16="http://schemas.microsoft.com/office/drawing/2014/main" id="{CD557807-7CF1-4F8B-97D9-795D08227EF2}"/>
               </a:ext>
             </a:extLst>
           </p:cNvPr>
@@ -2029,7 +2023,7 @@
           <a:bodyPr/>
           <a:lstStyle/>
           <a:p>
-            <a:fld id="{9C7B1245-2384-4BDE-9B43-9AD3B9B72D39}" type="slidenum">
+            <a:fld id="{03206E23-133B-40BF-9B80-283263BFD353}" type="slidenum">
               <a:rPr lang="en-US" smtClean="0"/>
               <a:t>‹Nº›</a:t>
             </a:fld>
@@ -2040,7 +2034,7 @@
     </p:spTree>
     <p:extLst>
       <p:ext uri="{BB962C8B-B14F-4D97-AF65-F5344CB8AC3E}">
-        <p14:creationId xmlns:p14="http://schemas.microsoft.com/office/powerpoint/2010/main" val="1853660058"/>
+        <p14:creationId xmlns:p14="http://schemas.microsoft.com/office/powerpoint/2010/main" val="3689085343"/>
       </p:ext>
     </p:extLst>
   </p:cSld>
@@ -2072,7 +2066,7 @@
           <p:cNvPr id="2" name="Marcador de fecha 1">
             <a:extLst>
               <a:ext uri="{FF2B5EF4-FFF2-40B4-BE49-F238E27FC236}">
-                <a16:creationId xmlns:a16="http://schemas.microsoft.com/office/drawing/2014/main" id="{9B20A666-E361-4BA7-A814-772B2AAFD3AB}"/>
+                <a16:creationId xmlns:a16="http://schemas.microsoft.com/office/drawing/2014/main" id="{41431E9E-9CF4-46F3-99B8-95A7D07907EC}"/>
               </a:ext>
             </a:extLst>
           </p:cNvPr>
@@ -2088,9 +2082,9 @@
           <a:bodyPr/>
           <a:lstStyle/>
           <a:p>
-            <a:fld id="{8588056D-2AA2-4399-8400-2BB1E32C2A20}" type="datetimeFigureOut">
+            <a:fld id="{D650E5C9-1D6A-47FA-936B-25F60BF7ECC4}" type="datetimeFigureOut">
               <a:rPr lang="en-US" smtClean="0"/>
-              <a:t>8/12/2025</a:t>
+              <a:t>10/15/2025</a:t>
             </a:fld>
             <a:endParaRPr lang="en-US"/>
           </a:p>
@@ -2101,7 +2095,7 @@
           <p:cNvPr id="3" name="Marcador de pie de página 2">
             <a:extLst>
               <a:ext uri="{FF2B5EF4-FFF2-40B4-BE49-F238E27FC236}">
-                <a16:creationId xmlns:a16="http://schemas.microsoft.com/office/drawing/2014/main" id="{14F1D3E2-C9E4-4353-B550-3328FC3FDC86}"/>
+                <a16:creationId xmlns:a16="http://schemas.microsoft.com/office/drawing/2014/main" id="{E09D923E-5E05-4F45-BACE-34B0271802E4}"/>
               </a:ext>
             </a:extLst>
           </p:cNvPr>
@@ -2126,7 +2120,7 @@
           <p:cNvPr id="4" name="Marcador de número de diapositiva 3">
             <a:extLst>
               <a:ext uri="{FF2B5EF4-FFF2-40B4-BE49-F238E27FC236}">
-                <a16:creationId xmlns:a16="http://schemas.microsoft.com/office/drawing/2014/main" id="{8A2E5026-2EC2-461A-ACEB-3C2710987DDC}"/>
+                <a16:creationId xmlns:a16="http://schemas.microsoft.com/office/drawing/2014/main" id="{9A94B105-87FD-491F-9D10-BAB5DAA3C083}"/>
               </a:ext>
             </a:extLst>
           </p:cNvPr>
@@ -2142,7 +2136,7 @@
           <a:bodyPr/>
           <a:lstStyle/>
           <a:p>
-            <a:fld id="{9C7B1245-2384-4BDE-9B43-9AD3B9B72D39}" type="slidenum">
+            <a:fld id="{03206E23-133B-40BF-9B80-283263BFD353}" type="slidenum">
               <a:rPr lang="en-US" smtClean="0"/>
               <a:t>‹Nº›</a:t>
             </a:fld>
@@ -2153,7 +2147,7 @@
     </p:spTree>
     <p:extLst>
       <p:ext uri="{BB962C8B-B14F-4D97-AF65-F5344CB8AC3E}">
-        <p14:creationId xmlns:p14="http://schemas.microsoft.com/office/powerpoint/2010/main" val="1903871323"/>
+        <p14:creationId xmlns:p14="http://schemas.microsoft.com/office/powerpoint/2010/main" val="950964204"/>
       </p:ext>
     </p:extLst>
   </p:cSld>
@@ -2185,7 +2179,7 @@
           <p:cNvPr id="2" name="Título 1">
             <a:extLst>
               <a:ext uri="{FF2B5EF4-FFF2-40B4-BE49-F238E27FC236}">
-                <a16:creationId xmlns:a16="http://schemas.microsoft.com/office/drawing/2014/main" id="{99939046-E55B-41F2-82CB-09C405FBDC15}"/>
+                <a16:creationId xmlns:a16="http://schemas.microsoft.com/office/drawing/2014/main" id="{521C36E4-83C5-476B-84FA-1ECF41CFAEA3}"/>
               </a:ext>
             </a:extLst>
           </p:cNvPr>
@@ -2223,7 +2217,7 @@
           <p:cNvPr id="3" name="Marcador de contenido 2">
             <a:extLst>
               <a:ext uri="{FF2B5EF4-FFF2-40B4-BE49-F238E27FC236}">
-                <a16:creationId xmlns:a16="http://schemas.microsoft.com/office/drawing/2014/main" id="{EED8D4D5-4C09-4166-9FD6-15664C7815E1}"/>
+                <a16:creationId xmlns:a16="http://schemas.microsoft.com/office/drawing/2014/main" id="{5A61E43C-05E6-4A10-B74E-A9883BCA7F30}"/>
               </a:ext>
             </a:extLst>
           </p:cNvPr>
@@ -2314,7 +2308,7 @@
           <p:cNvPr id="4" name="Marcador de texto 3">
             <a:extLst>
               <a:ext uri="{FF2B5EF4-FFF2-40B4-BE49-F238E27FC236}">
-                <a16:creationId xmlns:a16="http://schemas.microsoft.com/office/drawing/2014/main" id="{8CDFF1A1-D093-4CAA-94FC-9FA560E9613D}"/>
+                <a16:creationId xmlns:a16="http://schemas.microsoft.com/office/drawing/2014/main" id="{59240C14-5B2C-4ABA-BF0E-66BA30A6BC2E}"/>
               </a:ext>
             </a:extLst>
           </p:cNvPr>
@@ -2385,7 +2379,7 @@
           <p:cNvPr id="5" name="Marcador de fecha 4">
             <a:extLst>
               <a:ext uri="{FF2B5EF4-FFF2-40B4-BE49-F238E27FC236}">
-                <a16:creationId xmlns:a16="http://schemas.microsoft.com/office/drawing/2014/main" id="{174C47F2-6AC6-42B1-AFB3-0DE65C3095A1}"/>
+                <a16:creationId xmlns:a16="http://schemas.microsoft.com/office/drawing/2014/main" id="{C060D61A-6EED-4843-B110-BDDDC80CBBAA}"/>
               </a:ext>
             </a:extLst>
           </p:cNvPr>
@@ -2401,9 +2395,9 @@
           <a:bodyPr/>
           <a:lstStyle/>
           <a:p>
-            <a:fld id="{8588056D-2AA2-4399-8400-2BB1E32C2A20}" type="datetimeFigureOut">
+            <a:fld id="{D650E5C9-1D6A-47FA-936B-25F60BF7ECC4}" type="datetimeFigureOut">
               <a:rPr lang="en-US" smtClean="0"/>
-              <a:t>8/12/2025</a:t>
+              <a:t>10/15/2025</a:t>
             </a:fld>
             <a:endParaRPr lang="en-US"/>
           </a:p>
@@ -2414,7 +2408,7 @@
           <p:cNvPr id="6" name="Marcador de pie de página 5">
             <a:extLst>
               <a:ext uri="{FF2B5EF4-FFF2-40B4-BE49-F238E27FC236}">
-                <a16:creationId xmlns:a16="http://schemas.microsoft.com/office/drawing/2014/main" id="{E1FCE525-4C6C-475B-980C-176FE958FDB6}"/>
+                <a16:creationId xmlns:a16="http://schemas.microsoft.com/office/drawing/2014/main" id="{9DFDCE34-7945-4A24-AFCB-0F5BD177F417}"/>
               </a:ext>
             </a:extLst>
           </p:cNvPr>
@@ -2439,7 +2433,7 @@
           <p:cNvPr id="7" name="Marcador de número de diapositiva 6">
             <a:extLst>
               <a:ext uri="{FF2B5EF4-FFF2-40B4-BE49-F238E27FC236}">
-                <a16:creationId xmlns:a16="http://schemas.microsoft.com/office/drawing/2014/main" id="{0448DBB1-951B-4B53-AE2E-A825A704CB99}"/>
+                <a16:creationId xmlns:a16="http://schemas.microsoft.com/office/drawing/2014/main" id="{391285D9-F390-4CE5-ACA6-C4DF4A7989FD}"/>
               </a:ext>
             </a:extLst>
           </p:cNvPr>
@@ -2455,7 +2449,7 @@
           <a:bodyPr/>
           <a:lstStyle/>
           <a:p>
-            <a:fld id="{9C7B1245-2384-4BDE-9B43-9AD3B9B72D39}" type="slidenum">
+            <a:fld id="{03206E23-133B-40BF-9B80-283263BFD353}" type="slidenum">
               <a:rPr lang="en-US" smtClean="0"/>
               <a:t>‹Nº›</a:t>
             </a:fld>
@@ -2466,7 +2460,7 @@
     </p:spTree>
     <p:extLst>
       <p:ext uri="{BB962C8B-B14F-4D97-AF65-F5344CB8AC3E}">
-        <p14:creationId xmlns:p14="http://schemas.microsoft.com/office/powerpoint/2010/main" val="3557221260"/>
+        <p14:creationId xmlns:p14="http://schemas.microsoft.com/office/powerpoint/2010/main" val="1914725254"/>
       </p:ext>
     </p:extLst>
   </p:cSld>
@@ -2498,7 +2492,7 @@
           <p:cNvPr id="2" name="Título 1">
             <a:extLst>
               <a:ext uri="{FF2B5EF4-FFF2-40B4-BE49-F238E27FC236}">
-                <a16:creationId xmlns:a16="http://schemas.microsoft.com/office/drawing/2014/main" id="{006DB196-5F90-437B-883E-517F5AF0C673}"/>
+                <a16:creationId xmlns:a16="http://schemas.microsoft.com/office/drawing/2014/main" id="{16F3361F-3BF1-4DD8-BC1F-06C2CD34EAD3}"/>
               </a:ext>
             </a:extLst>
           </p:cNvPr>
@@ -2536,7 +2530,7 @@
           <p:cNvPr id="3" name="Marcador de posición de imagen 2">
             <a:extLst>
               <a:ext uri="{FF2B5EF4-FFF2-40B4-BE49-F238E27FC236}">
-                <a16:creationId xmlns:a16="http://schemas.microsoft.com/office/drawing/2014/main" id="{57390C98-2EC6-4B8F-A0BF-1AB70996E292}"/>
+                <a16:creationId xmlns:a16="http://schemas.microsoft.com/office/drawing/2014/main" id="{90D6AEB2-DDF0-4E0B-82FB-E2B9644F4673}"/>
               </a:ext>
             </a:extLst>
           </p:cNvPr>
@@ -2603,7 +2597,7 @@
           <p:cNvPr id="4" name="Marcador de texto 3">
             <a:extLst>
               <a:ext uri="{FF2B5EF4-FFF2-40B4-BE49-F238E27FC236}">
-                <a16:creationId xmlns:a16="http://schemas.microsoft.com/office/drawing/2014/main" id="{BC7FD6AC-9EB0-4AFE-AA08-BD372D36CD9F}"/>
+                <a16:creationId xmlns:a16="http://schemas.microsoft.com/office/drawing/2014/main" id="{1466725C-9E82-4347-8128-0838C190C19B}"/>
               </a:ext>
             </a:extLst>
           </p:cNvPr>
@@ -2674,7 +2668,7 @@
           <p:cNvPr id="5" name="Marcador de fecha 4">
             <a:extLst>
               <a:ext uri="{FF2B5EF4-FFF2-40B4-BE49-F238E27FC236}">
-                <a16:creationId xmlns:a16="http://schemas.microsoft.com/office/drawing/2014/main" id="{A7E66CD1-5FF3-46FF-9617-AFCB22D920AD}"/>
+                <a16:creationId xmlns:a16="http://schemas.microsoft.com/office/drawing/2014/main" id="{A30D67C3-A308-4DE6-B29D-E9758A2BD864}"/>
               </a:ext>
             </a:extLst>
           </p:cNvPr>
@@ -2690,9 +2684,9 @@
           <a:bodyPr/>
           <a:lstStyle/>
           <a:p>
-            <a:fld id="{8588056D-2AA2-4399-8400-2BB1E32C2A20}" type="datetimeFigureOut">
+            <a:fld id="{D650E5C9-1D6A-47FA-936B-25F60BF7ECC4}" type="datetimeFigureOut">
               <a:rPr lang="en-US" smtClean="0"/>
-              <a:t>8/12/2025</a:t>
+              <a:t>10/15/2025</a:t>
             </a:fld>
             <a:endParaRPr lang="en-US"/>
           </a:p>
@@ -2703,7 +2697,7 @@
           <p:cNvPr id="6" name="Marcador de pie de página 5">
             <a:extLst>
               <a:ext uri="{FF2B5EF4-FFF2-40B4-BE49-F238E27FC236}">
-                <a16:creationId xmlns:a16="http://schemas.microsoft.com/office/drawing/2014/main" id="{FCA6D44C-B292-4B1B-88D4-5EBB1372A737}"/>
+                <a16:creationId xmlns:a16="http://schemas.microsoft.com/office/drawing/2014/main" id="{CDE71D82-2AB9-406B-A0D1-8C3B16ED535E}"/>
               </a:ext>
             </a:extLst>
           </p:cNvPr>
@@ -2728,7 +2722,7 @@
           <p:cNvPr id="7" name="Marcador de número de diapositiva 6">
             <a:extLst>
               <a:ext uri="{FF2B5EF4-FFF2-40B4-BE49-F238E27FC236}">
-                <a16:creationId xmlns:a16="http://schemas.microsoft.com/office/drawing/2014/main" id="{BDD3A35B-FCEB-45D1-84A2-14ACBF0D532A}"/>
+                <a16:creationId xmlns:a16="http://schemas.microsoft.com/office/drawing/2014/main" id="{2EA5042D-DC05-4F6A-8A68-39A8FA9A3BDF}"/>
               </a:ext>
             </a:extLst>
           </p:cNvPr>
@@ -2744,7 +2738,7 @@
           <a:bodyPr/>
           <a:lstStyle/>
           <a:p>
-            <a:fld id="{9C7B1245-2384-4BDE-9B43-9AD3B9B72D39}" type="slidenum">
+            <a:fld id="{03206E23-133B-40BF-9B80-283263BFD353}" type="slidenum">
               <a:rPr lang="en-US" smtClean="0"/>
               <a:t>‹Nº›</a:t>
             </a:fld>
@@ -2755,7 +2749,7 @@
     </p:spTree>
     <p:extLst>
       <p:ext uri="{BB962C8B-B14F-4D97-AF65-F5344CB8AC3E}">
-        <p14:creationId xmlns:p14="http://schemas.microsoft.com/office/powerpoint/2010/main" val="875466765"/>
+        <p14:creationId xmlns:p14="http://schemas.microsoft.com/office/powerpoint/2010/main" val="2597044172"/>
       </p:ext>
     </p:extLst>
   </p:cSld>
@@ -2792,7 +2786,7 @@
           <p:cNvPr id="2" name="Marcador de título 1">
             <a:extLst>
               <a:ext uri="{FF2B5EF4-FFF2-40B4-BE49-F238E27FC236}">
-                <a16:creationId xmlns:a16="http://schemas.microsoft.com/office/drawing/2014/main" id="{5B153C9F-F7D9-44A1-A672-77F5FBB9631F}"/>
+                <a16:creationId xmlns:a16="http://schemas.microsoft.com/office/drawing/2014/main" id="{03ECF056-9287-4240-A13C-74749AEB9609}"/>
               </a:ext>
             </a:extLst>
           </p:cNvPr>
@@ -2831,7 +2825,7 @@
           <p:cNvPr id="3" name="Marcador de texto 2">
             <a:extLst>
               <a:ext uri="{FF2B5EF4-FFF2-40B4-BE49-F238E27FC236}">
-                <a16:creationId xmlns:a16="http://schemas.microsoft.com/office/drawing/2014/main" id="{89BAD56D-7121-48BF-B57F-3216C8B1FEE8}"/>
+                <a16:creationId xmlns:a16="http://schemas.microsoft.com/office/drawing/2014/main" id="{901898A1-9EBB-4F87-9923-DFFE034F0726}"/>
               </a:ext>
             </a:extLst>
           </p:cNvPr>
@@ -2899,7 +2893,7 @@
           <p:cNvPr id="4" name="Marcador de fecha 3">
             <a:extLst>
               <a:ext uri="{FF2B5EF4-FFF2-40B4-BE49-F238E27FC236}">
-                <a16:creationId xmlns:a16="http://schemas.microsoft.com/office/drawing/2014/main" id="{9560D4C5-7FA0-4570-9CC3-5575F2649C95}"/>
+                <a16:creationId xmlns:a16="http://schemas.microsoft.com/office/drawing/2014/main" id="{7545AF83-35A9-4718-B3AC-59390BA4035B}"/>
               </a:ext>
             </a:extLst>
           </p:cNvPr>
@@ -2933,9 +2927,9 @@
             </a:lvl1pPr>
           </a:lstStyle>
           <a:p>
-            <a:fld id="{8588056D-2AA2-4399-8400-2BB1E32C2A20}" type="datetimeFigureOut">
+            <a:fld id="{D650E5C9-1D6A-47FA-936B-25F60BF7ECC4}" type="datetimeFigureOut">
               <a:rPr lang="en-US" smtClean="0"/>
-              <a:t>8/12/2025</a:t>
+              <a:t>10/15/2025</a:t>
             </a:fld>
             <a:endParaRPr lang="en-US"/>
           </a:p>
@@ -2946,7 +2940,7 @@
           <p:cNvPr id="5" name="Marcador de pie de página 4">
             <a:extLst>
               <a:ext uri="{FF2B5EF4-FFF2-40B4-BE49-F238E27FC236}">
-                <a16:creationId xmlns:a16="http://schemas.microsoft.com/office/drawing/2014/main" id="{232B1609-8009-4AD1-9615-82BDE12CF4EC}"/>
+                <a16:creationId xmlns:a16="http://schemas.microsoft.com/office/drawing/2014/main" id="{D3FA1B93-6AD7-44C2-886F-0B5E9D1A5B85}"/>
               </a:ext>
             </a:extLst>
           </p:cNvPr>
@@ -2989,7 +2983,7 @@
           <p:cNvPr id="6" name="Marcador de número de diapositiva 5">
             <a:extLst>
               <a:ext uri="{FF2B5EF4-FFF2-40B4-BE49-F238E27FC236}">
-                <a16:creationId xmlns:a16="http://schemas.microsoft.com/office/drawing/2014/main" id="{C0E06B94-5286-4E11-8230-507514198797}"/>
+                <a16:creationId xmlns:a16="http://schemas.microsoft.com/office/drawing/2014/main" id="{B34B44B6-59CC-4B40-8EE9-03AFF0BFB342}"/>
               </a:ext>
             </a:extLst>
           </p:cNvPr>
@@ -3023,7 +3017,7 @@
             </a:lvl1pPr>
           </a:lstStyle>
           <a:p>
-            <a:fld id="{9C7B1245-2384-4BDE-9B43-9AD3B9B72D39}" type="slidenum">
+            <a:fld id="{03206E23-133B-40BF-9B80-283263BFD353}" type="slidenum">
               <a:rPr lang="en-US" smtClean="0"/>
               <a:t>‹Nº›</a:t>
             </a:fld>
@@ -3034,7 +3028,7 @@
     </p:spTree>
     <p:extLst>
       <p:ext uri="{BB962C8B-B14F-4D97-AF65-F5344CB8AC3E}">
-        <p14:creationId xmlns:p14="http://schemas.microsoft.com/office/powerpoint/2010/main" val="3474142802"/>
+        <p14:creationId xmlns:p14="http://schemas.microsoft.com/office/powerpoint/2010/main" val="1672798680"/>
       </p:ext>
     </p:extLst>
   </p:cSld>
@@ -3357,7 +3351,7 @@
           <p:cNvPr id="2" name="Título 1">
             <a:extLst>
               <a:ext uri="{FF2B5EF4-FFF2-40B4-BE49-F238E27FC236}">
-                <a16:creationId xmlns:a16="http://schemas.microsoft.com/office/drawing/2014/main" id="{EE967175-4324-4D12-A310-78DF4F5C9C1A}"/>
+                <a16:creationId xmlns:a16="http://schemas.microsoft.com/office/drawing/2014/main" id="{126A65CA-AA8A-4819-907E-9B813E1C6F25}"/>
               </a:ext>
             </a:extLst>
           </p:cNvPr>
@@ -3375,7 +3369,11 @@
           <a:p>
             <a:r>
               <a:rPr lang="es-CO" dirty="0"/>
-              <a:t>Documento Final</a:t>
+              <a:t>Documento Final </a:t>
+            </a:r>
+            <a:r>
+              <a:rPr lang="es-CO" dirty="0" err="1"/>
+              <a:t>Iniciacion</a:t>
             </a:r>
             <a:endParaRPr lang="en-US" dirty="0"/>
           </a:p>
@@ -3386,7 +3384,7 @@
           <p:cNvPr id="3" name="Subtítulo 2">
             <a:extLst>
               <a:ext uri="{FF2B5EF4-FFF2-40B4-BE49-F238E27FC236}">
-                <a16:creationId xmlns:a16="http://schemas.microsoft.com/office/drawing/2014/main" id="{5F912D0C-5433-4FD1-B431-E792CD3D5CF1}"/>
+                <a16:creationId xmlns:a16="http://schemas.microsoft.com/office/drawing/2014/main" id="{812033E5-7CEA-46FA-BECC-C0CDAB19DE5E}"/>
               </a:ext>
             </a:extLst>
           </p:cNvPr>
@@ -3402,18 +3400,14 @@
           <a:bodyPr/>
           <a:lstStyle/>
           <a:p>
-            <a:r>
-              <a:rPr lang="es-CO" dirty="0"/>
-              <a:t>Presentado por: Nicolas Calvo</a:t>
-            </a:r>
-            <a:endParaRPr lang="en-US" dirty="0"/>
+            <a:endParaRPr lang="en-US"/>
           </a:p>
         </p:txBody>
       </p:sp>
     </p:spTree>
     <p:extLst>
       <p:ext uri="{BB962C8B-B14F-4D97-AF65-F5344CB8AC3E}">
-        <p14:creationId xmlns:p14="http://schemas.microsoft.com/office/powerpoint/2010/main" val="101407207"/>
+        <p14:creationId xmlns:p14="http://schemas.microsoft.com/office/powerpoint/2010/main" val="3196462896"/>
       </p:ext>
     </p:extLst>
   </p:cSld>
@@ -3445,7 +3439,7 @@
           <p:cNvPr id="2" name="Título 1">
             <a:extLst>
               <a:ext uri="{FF2B5EF4-FFF2-40B4-BE49-F238E27FC236}">
-                <a16:creationId xmlns:a16="http://schemas.microsoft.com/office/drawing/2014/main" id="{97220872-2D87-4BA8-9920-9557D3A3461A}"/>
+                <a16:creationId xmlns:a16="http://schemas.microsoft.com/office/drawing/2014/main" id="{3D8BA06B-D085-4F70-807B-76A56F3518E3}"/>
               </a:ext>
             </a:extLst>
           </p:cNvPr>
@@ -3461,7 +3455,11 @@
           <a:bodyPr/>
           <a:lstStyle/>
           <a:p>
-            <a:endParaRPr lang="en-US"/>
+            <a:r>
+              <a:rPr lang="es-CO" dirty="0"/>
+              <a:t>Se realizo la Pagina Web</a:t>
+            </a:r>
+            <a:endParaRPr lang="en-US" dirty="0"/>
           </a:p>
         </p:txBody>
       </p:sp>
@@ -3470,7 +3468,7 @@
           <p:cNvPr id="3" name="Marcador de contenido 2">
             <a:extLst>
               <a:ext uri="{FF2B5EF4-FFF2-40B4-BE49-F238E27FC236}">
-                <a16:creationId xmlns:a16="http://schemas.microsoft.com/office/drawing/2014/main" id="{36A37B07-DBF7-4CE5-886C-D18F9CA8CEE8}"/>
+                <a16:creationId xmlns:a16="http://schemas.microsoft.com/office/drawing/2014/main" id="{8138A4EF-C384-4722-8906-6295C9AD377A}"/>
               </a:ext>
             </a:extLst>
           </p:cNvPr>
@@ -3486,14 +3484,50 @@
           <a:bodyPr/>
           <a:lstStyle/>
           <a:p>
-            <a:endParaRPr lang="en-US"/>
-          </a:p>
-        </p:txBody>
-      </p:sp>
+            <a:r>
+              <a:rPr lang="es-CO" dirty="0"/>
+              <a:t>Se creo una pagina web que guardara todos los documentos que vayamos a subir.</a:t>
+            </a:r>
+          </a:p>
+          <a:p>
+            <a:endParaRPr lang="en-US" dirty="0"/>
+          </a:p>
+        </p:txBody>
+      </p:sp>
+      <p:pic>
+        <p:nvPicPr>
+          <p:cNvPr id="5" name="Imagen 4">
+            <a:extLst>
+              <a:ext uri="{FF2B5EF4-FFF2-40B4-BE49-F238E27FC236}">
+                <a16:creationId xmlns:a16="http://schemas.microsoft.com/office/drawing/2014/main" id="{7030D576-0440-407D-B0AE-58942DE29FEB}"/>
+              </a:ext>
+            </a:extLst>
+          </p:cNvPr>
+          <p:cNvPicPr>
+            <a:picLocks noChangeAspect="1"/>
+          </p:cNvPicPr>
+          <p:nvPr/>
+        </p:nvPicPr>
+        <p:blipFill>
+          <a:blip r:embed="rId2"/>
+          <a:stretch>
+            <a:fillRect/>
+          </a:stretch>
+        </p:blipFill>
+        <p:spPr>
+          <a:xfrm>
+            <a:off x="951790" y="2803961"/>
+            <a:ext cx="9308742" cy="3785359"/>
+          </a:xfrm>
+          <a:prstGeom prst="rect">
+            <a:avLst/>
+          </a:prstGeom>
+        </p:spPr>
+      </p:pic>
     </p:spTree>
     <p:extLst>
       <p:ext uri="{BB962C8B-B14F-4D97-AF65-F5344CB8AC3E}">
-        <p14:creationId xmlns:p14="http://schemas.microsoft.com/office/powerpoint/2010/main" val="1785867095"/>
+        <p14:creationId xmlns:p14="http://schemas.microsoft.com/office/powerpoint/2010/main" val="2694376909"/>
       </p:ext>
     </p:extLst>
   </p:cSld>
@@ -3525,7 +3559,7 @@
           <p:cNvPr id="2" name="Título 1">
             <a:extLst>
               <a:ext uri="{FF2B5EF4-FFF2-40B4-BE49-F238E27FC236}">
-                <a16:creationId xmlns:a16="http://schemas.microsoft.com/office/drawing/2014/main" id="{9AA71AFA-20F3-4586-9024-BD39C600B7E3}"/>
+                <a16:creationId xmlns:a16="http://schemas.microsoft.com/office/drawing/2014/main" id="{0DF55DDA-8043-4329-8B18-8A643953D1EF}"/>
               </a:ext>
             </a:extLst>
           </p:cNvPr>
@@ -3541,7 +3575,15 @@
           <a:bodyPr/>
           <a:lstStyle/>
           <a:p>
-            <a:endParaRPr lang="en-US"/>
+            <a:r>
+              <a:rPr lang="es-CO" dirty="0"/>
+              <a:t>Acta de </a:t>
+            </a:r>
+            <a:r>
+              <a:rPr lang="es-CO" dirty="0" err="1"/>
+              <a:t>Iniciacion</a:t>
+            </a:r>
+            <a:endParaRPr lang="en-US" dirty="0"/>
           </a:p>
         </p:txBody>
       </p:sp>
@@ -3550,7 +3592,7 @@
           <p:cNvPr id="3" name="Marcador de contenido 2">
             <a:extLst>
               <a:ext uri="{FF2B5EF4-FFF2-40B4-BE49-F238E27FC236}">
-                <a16:creationId xmlns:a16="http://schemas.microsoft.com/office/drawing/2014/main" id="{98408889-1BD5-47A3-8E60-7728F29763F9}"/>
+                <a16:creationId xmlns:a16="http://schemas.microsoft.com/office/drawing/2014/main" id="{A2A15AB2-C7C5-4A79-AB0E-4EEF68701920}"/>
               </a:ext>
             </a:extLst>
           </p:cNvPr>
@@ -3566,14 +3608,26 @@
           <a:bodyPr/>
           <a:lstStyle/>
           <a:p>
-            <a:endParaRPr lang="en-US"/>
+            <a:r>
+              <a:rPr lang="es-CO" dirty="0"/>
+              <a:t>Se hizo la acta de </a:t>
+            </a:r>
+            <a:r>
+              <a:rPr lang="es-CO" dirty="0" err="1"/>
+              <a:t>iniciaion</a:t>
+            </a:r>
+            <a:r>
+              <a:rPr lang="es-CO" dirty="0"/>
+              <a:t> de grupo con las métricas de cada rol y de cada de sus integrantes con los objetivos y compromisos</a:t>
+            </a:r>
+            <a:endParaRPr lang="en-US" dirty="0"/>
           </a:p>
         </p:txBody>
       </p:sp>
     </p:spTree>
     <p:extLst>
       <p:ext uri="{BB962C8B-B14F-4D97-AF65-F5344CB8AC3E}">
-        <p14:creationId xmlns:p14="http://schemas.microsoft.com/office/powerpoint/2010/main" val="1256612719"/>
+        <p14:creationId xmlns:p14="http://schemas.microsoft.com/office/powerpoint/2010/main" val="4058502384"/>
       </p:ext>
     </p:extLst>
   </p:cSld>
@@ -3605,7 +3659,7 @@
           <p:cNvPr id="2" name="Título 1">
             <a:extLst>
               <a:ext uri="{FF2B5EF4-FFF2-40B4-BE49-F238E27FC236}">
-                <a16:creationId xmlns:a16="http://schemas.microsoft.com/office/drawing/2014/main" id="{5C82B1A4-E413-47C2-9D29-8964D62B2245}"/>
+                <a16:creationId xmlns:a16="http://schemas.microsoft.com/office/drawing/2014/main" id="{555A6477-2107-4824-B7FF-B118DEFE341D}"/>
               </a:ext>
             </a:extLst>
           </p:cNvPr>
@@ -3621,7 +3675,11 @@
           <a:bodyPr/>
           <a:lstStyle/>
           <a:p>
-            <a:endParaRPr lang="en-US"/>
+            <a:r>
+              <a:rPr lang="es-CO" dirty="0"/>
+              <a:t>Documentos Hechos</a:t>
+            </a:r>
+            <a:endParaRPr lang="en-US" dirty="0"/>
           </a:p>
         </p:txBody>
       </p:sp>
@@ -3630,7 +3688,7 @@
           <p:cNvPr id="3" name="Marcador de contenido 2">
             <a:extLst>
               <a:ext uri="{FF2B5EF4-FFF2-40B4-BE49-F238E27FC236}">
-                <a16:creationId xmlns:a16="http://schemas.microsoft.com/office/drawing/2014/main" id="{2DC07D28-CB91-455C-9EA1-3B50FE3A665C}"/>
+                <a16:creationId xmlns:a16="http://schemas.microsoft.com/office/drawing/2014/main" id="{0B0E136F-BCE6-490C-B898-2174691A0019}"/>
               </a:ext>
             </a:extLst>
           </p:cNvPr>
@@ -3646,14 +3704,34 @@
           <a:bodyPr/>
           <a:lstStyle/>
           <a:p>
-            <a:endParaRPr lang="en-US"/>
+            <a:r>
+              <a:rPr lang="es-CO" dirty="0"/>
+              <a:t>Se hizo varios documentos como log de </a:t>
+            </a:r>
+            <a:r>
+              <a:rPr lang="es-CO" dirty="0" err="1"/>
+              <a:t>defectos,controlAsignaciones,Script</a:t>
+            </a:r>
+            <a:r>
+              <a:rPr lang="es-CO" dirty="0"/>
+              <a:t> </a:t>
+            </a:r>
+            <a:r>
+              <a:rPr lang="es-CO" dirty="0" err="1"/>
+              <a:t>iniciación,maestro</a:t>
+            </a:r>
+            <a:r>
+              <a:rPr lang="es-CO" dirty="0"/>
+              <a:t> de documento.</a:t>
+            </a:r>
+            <a:endParaRPr lang="en-US" dirty="0"/>
           </a:p>
         </p:txBody>
       </p:sp>
     </p:spTree>
     <p:extLst>
       <p:ext uri="{BB962C8B-B14F-4D97-AF65-F5344CB8AC3E}">
-        <p14:creationId xmlns:p14="http://schemas.microsoft.com/office/powerpoint/2010/main" val="2462015047"/>
+        <p14:creationId xmlns:p14="http://schemas.microsoft.com/office/powerpoint/2010/main" val="2023375026"/>
       </p:ext>
     </p:extLst>
   </p:cSld>
@@ -3685,7 +3763,7 @@
           <p:cNvPr id="2" name="Título 1">
             <a:extLst>
               <a:ext uri="{FF2B5EF4-FFF2-40B4-BE49-F238E27FC236}">
-                <a16:creationId xmlns:a16="http://schemas.microsoft.com/office/drawing/2014/main" id="{A9FCD440-7721-4512-B75B-9FFD7E267FFD}"/>
+                <a16:creationId xmlns:a16="http://schemas.microsoft.com/office/drawing/2014/main" id="{ABC899EC-CAFD-42DF-9A32-88F00D1D4FAA}"/>
               </a:ext>
             </a:extLst>
           </p:cNvPr>
@@ -3701,7 +3779,11 @@
           <a:bodyPr/>
           <a:lstStyle/>
           <a:p>
-            <a:endParaRPr lang="en-US"/>
+            <a:r>
+              <a:rPr lang="es-CO" dirty="0" err="1"/>
+              <a:t>Bitacora</a:t>
+            </a:r>
+            <a:endParaRPr lang="en-US" dirty="0"/>
           </a:p>
         </p:txBody>
       </p:sp>
@@ -3710,7 +3792,7 @@
           <p:cNvPr id="3" name="Marcador de contenido 2">
             <a:extLst>
               <a:ext uri="{FF2B5EF4-FFF2-40B4-BE49-F238E27FC236}">
-                <a16:creationId xmlns:a16="http://schemas.microsoft.com/office/drawing/2014/main" id="{2A5F229B-F498-4FCA-B25D-AC2CCB9CB926}"/>
+                <a16:creationId xmlns:a16="http://schemas.microsoft.com/office/drawing/2014/main" id="{EB72ECF1-E6DE-488D-8ACB-B70797B17A4C}"/>
               </a:ext>
             </a:extLst>
           </p:cNvPr>
@@ -3726,6 +3808,14 @@
           <a:bodyPr/>
           <a:lstStyle/>
           <a:p>
+            <a:r>
+              <a:rPr lang="es-CO" dirty="0"/>
+              <a:t>Cada integrante realizo su bitácora con el tiempo que hizo en </a:t>
+            </a:r>
+            <a:r>
+              <a:rPr lang="es-CO"/>
+              <a:t>cada actividad</a:t>
+            </a:r>
             <a:endParaRPr lang="en-US"/>
           </a:p>
         </p:txBody>
@@ -3733,87 +3823,7 @@
     </p:spTree>
     <p:extLst>
       <p:ext uri="{BB962C8B-B14F-4D97-AF65-F5344CB8AC3E}">
-        <p14:creationId xmlns:p14="http://schemas.microsoft.com/office/powerpoint/2010/main" val="2147298703"/>
-      </p:ext>
-    </p:extLst>
-  </p:cSld>
-  <p:clrMapOvr>
-    <a:masterClrMapping/>
-  </p:clrMapOvr>
-</p:sld>
-</file>
-
-<file path=ppt/slides/slide6.xml><?xml version="1.0" encoding="utf-8"?>
-<p:sld xmlns:a="http://schemas.openxmlformats.org/drawingml/2006/main" xmlns:r="http://schemas.openxmlformats.org/officeDocument/2006/relationships" xmlns:p="http://schemas.openxmlformats.org/presentationml/2006/main">
-  <p:cSld>
-    <p:spTree>
-      <p:nvGrpSpPr>
-        <p:cNvPr id="1" name=""/>
-        <p:cNvGrpSpPr/>
-        <p:nvPr/>
-      </p:nvGrpSpPr>
-      <p:grpSpPr>
-        <a:xfrm>
-          <a:off x="0" y="0"/>
-          <a:ext cx="0" cy="0"/>
-          <a:chOff x="0" y="0"/>
-          <a:chExt cx="0" cy="0"/>
-        </a:xfrm>
-      </p:grpSpPr>
-      <p:sp>
-        <p:nvSpPr>
-          <p:cNvPr id="2" name="Título 1">
-            <a:extLst>
-              <a:ext uri="{FF2B5EF4-FFF2-40B4-BE49-F238E27FC236}">
-                <a16:creationId xmlns:a16="http://schemas.microsoft.com/office/drawing/2014/main" id="{C15A506D-364B-4797-B021-52D0519E112D}"/>
-              </a:ext>
-            </a:extLst>
-          </p:cNvPr>
-          <p:cNvSpPr>
-            <a:spLocks noGrp="1"/>
-          </p:cNvSpPr>
-          <p:nvPr>
-            <p:ph type="title"/>
-          </p:nvPr>
-        </p:nvSpPr>
-        <p:spPr/>
-        <p:txBody>
-          <a:bodyPr/>
-          <a:lstStyle/>
-          <a:p>
-            <a:endParaRPr lang="en-US"/>
-          </a:p>
-        </p:txBody>
-      </p:sp>
-      <p:sp>
-        <p:nvSpPr>
-          <p:cNvPr id="3" name="Marcador de contenido 2">
-            <a:extLst>
-              <a:ext uri="{FF2B5EF4-FFF2-40B4-BE49-F238E27FC236}">
-                <a16:creationId xmlns:a16="http://schemas.microsoft.com/office/drawing/2014/main" id="{1CEDB848-70F8-4125-9520-AFFC6DE6F412}"/>
-              </a:ext>
-            </a:extLst>
-          </p:cNvPr>
-          <p:cNvSpPr>
-            <a:spLocks noGrp="1"/>
-          </p:cNvSpPr>
-          <p:nvPr>
-            <p:ph idx="1"/>
-          </p:nvPr>
-        </p:nvSpPr>
-        <p:spPr/>
-        <p:txBody>
-          <a:bodyPr/>
-          <a:lstStyle/>
-          <a:p>
-            <a:endParaRPr lang="en-US"/>
-          </a:p>
-        </p:txBody>
-      </p:sp>
-    </p:spTree>
-    <p:extLst>
-      <p:ext uri="{BB962C8B-B14F-4D97-AF65-F5344CB8AC3E}">
-        <p14:creationId xmlns:p14="http://schemas.microsoft.com/office/powerpoint/2010/main" val="2550589697"/>
+        <p14:creationId xmlns:p14="http://schemas.microsoft.com/office/powerpoint/2010/main" val="2224364412"/>
       </p:ext>
     </p:extLst>
   </p:cSld>

</xml_diff>